<commit_message>
added html and css
</commit_message>
<xml_diff>
--- a/Project game - Save the ocean!.pptx
+++ b/Project game - Save the ocean!.pptx
@@ -195,7 +195,7 @@
           <a:p>
             <a:fld id="{26C53E30-5B43-4B8C-98DF-629694846449}" type="datetimeFigureOut">
               <a:rPr lang="en-US" smtClean="0"/>
-              <a:t>12/2/2023</a:t>
+              <a:t>12/4/2023</a:t>
             </a:fld>
             <a:endParaRPr lang="en-US"/>
           </a:p>
@@ -1046,7 +1046,7 @@
           <a:p>
             <a:fld id="{36B51645-EAA9-4B66-90DA-CFA9E71E0CDB}" type="datetimeFigureOut">
               <a:rPr lang="en-US" smtClean="0"/>
-              <a:t>12/2/2023</a:t>
+              <a:t>12/4/2023</a:t>
             </a:fld>
             <a:endParaRPr lang="en-US"/>
           </a:p>
@@ -1216,7 +1216,7 @@
           <a:p>
             <a:fld id="{36B51645-EAA9-4B66-90DA-CFA9E71E0CDB}" type="datetimeFigureOut">
               <a:rPr lang="en-US" smtClean="0"/>
-              <a:t>12/2/2023</a:t>
+              <a:t>12/4/2023</a:t>
             </a:fld>
             <a:endParaRPr lang="en-US"/>
           </a:p>
@@ -1396,7 +1396,7 @@
           <a:p>
             <a:fld id="{36B51645-EAA9-4B66-90DA-CFA9E71E0CDB}" type="datetimeFigureOut">
               <a:rPr lang="en-US" smtClean="0"/>
-              <a:t>12/2/2023</a:t>
+              <a:t>12/4/2023</a:t>
             </a:fld>
             <a:endParaRPr lang="en-US"/>
           </a:p>
@@ -1566,7 +1566,7 @@
           <a:p>
             <a:fld id="{36B51645-EAA9-4B66-90DA-CFA9E71E0CDB}" type="datetimeFigureOut">
               <a:rPr lang="en-US" smtClean="0"/>
-              <a:t>12/2/2023</a:t>
+              <a:t>12/4/2023</a:t>
             </a:fld>
             <a:endParaRPr lang="en-US"/>
           </a:p>
@@ -1812,7 +1812,7 @@
           <a:p>
             <a:fld id="{36B51645-EAA9-4B66-90DA-CFA9E71E0CDB}" type="datetimeFigureOut">
               <a:rPr lang="en-US" smtClean="0"/>
-              <a:t>12/2/2023</a:t>
+              <a:t>12/4/2023</a:t>
             </a:fld>
             <a:endParaRPr lang="en-US"/>
           </a:p>
@@ -2100,7 +2100,7 @@
           <a:p>
             <a:fld id="{36B51645-EAA9-4B66-90DA-CFA9E71E0CDB}" type="datetimeFigureOut">
               <a:rPr lang="en-US" smtClean="0"/>
-              <a:t>12/2/2023</a:t>
+              <a:t>12/4/2023</a:t>
             </a:fld>
             <a:endParaRPr lang="en-US"/>
           </a:p>
@@ -2522,7 +2522,7 @@
           <a:p>
             <a:fld id="{36B51645-EAA9-4B66-90DA-CFA9E71E0CDB}" type="datetimeFigureOut">
               <a:rPr lang="en-US" smtClean="0"/>
-              <a:t>12/2/2023</a:t>
+              <a:t>12/4/2023</a:t>
             </a:fld>
             <a:endParaRPr lang="en-US"/>
           </a:p>
@@ -2640,7 +2640,7 @@
           <a:p>
             <a:fld id="{36B51645-EAA9-4B66-90DA-CFA9E71E0CDB}" type="datetimeFigureOut">
               <a:rPr lang="en-US" smtClean="0"/>
-              <a:t>12/2/2023</a:t>
+              <a:t>12/4/2023</a:t>
             </a:fld>
             <a:endParaRPr lang="en-US"/>
           </a:p>
@@ -2735,7 +2735,7 @@
           <a:p>
             <a:fld id="{36B51645-EAA9-4B66-90DA-CFA9E71E0CDB}" type="datetimeFigureOut">
               <a:rPr lang="en-US" smtClean="0"/>
-              <a:t>12/2/2023</a:t>
+              <a:t>12/4/2023</a:t>
             </a:fld>
             <a:endParaRPr lang="en-US"/>
           </a:p>
@@ -3012,7 +3012,7 @@
           <a:p>
             <a:fld id="{36B51645-EAA9-4B66-90DA-CFA9E71E0CDB}" type="datetimeFigureOut">
               <a:rPr lang="en-US" smtClean="0"/>
-              <a:t>12/2/2023</a:t>
+              <a:t>12/4/2023</a:t>
             </a:fld>
             <a:endParaRPr lang="en-US"/>
           </a:p>
@@ -3265,7 +3265,7 @@
           <a:p>
             <a:fld id="{36B51645-EAA9-4B66-90DA-CFA9E71E0CDB}" type="datetimeFigureOut">
               <a:rPr lang="en-US" smtClean="0"/>
-              <a:t>12/2/2023</a:t>
+              <a:t>12/4/2023</a:t>
             </a:fld>
             <a:endParaRPr lang="en-US"/>
           </a:p>
@@ -3478,7 +3478,7 @@
           <a:p>
             <a:fld id="{36B51645-EAA9-4B66-90DA-CFA9E71E0CDB}" type="datetimeFigureOut">
               <a:rPr lang="en-US" smtClean="0"/>
-              <a:t>12/2/2023</a:t>
+              <a:t>12/4/2023</a:t>
             </a:fld>
             <a:endParaRPr lang="en-US"/>
           </a:p>
@@ -5700,7 +5700,7 @@
                 <a:cs typeface="Arial" panose="020B0604020202020204" pitchFamily="34" charset="0"/>
                 <a:sym typeface="Wingdings" panose="05000000000000000000" pitchFamily="2" charset="2"/>
               </a:rPr>
-              <a:t> the small net </a:t>
+              <a:t> </a:t>
             </a:r>
             <a:r>
               <a:rPr lang="it-IT" sz="1600" b="1" spc="50" dirty="0" err="1" smtClean="0">
@@ -5879,7 +5879,37 @@
                 <a:cs typeface="Arial" panose="020B0604020202020204" pitchFamily="34" charset="0"/>
                 <a:sym typeface="Wingdings" panose="05000000000000000000" pitchFamily="2" charset="2"/>
               </a:rPr>
-              <a:t> the small net right</a:t>
+              <a:t> </a:t>
+            </a:r>
+            <a:r>
+              <a:rPr lang="it-IT" sz="1400" b="1" spc="50" dirty="0" smtClean="0">
+                <a:ln w="13500">
+                  <a:solidFill>
+                    <a:schemeClr val="accent1">
+                      <a:shade val="2500"/>
+                      <a:alpha val="6500"/>
+                    </a:schemeClr>
+                  </a:solidFill>
+                  <a:prstDash val="solid"/>
+                </a:ln>
+                <a:solidFill>
+                  <a:schemeClr val="accent1">
+                    <a:tint val="3000"/>
+                    <a:alpha val="95000"/>
+                  </a:schemeClr>
+                </a:solidFill>
+                <a:effectLst>
+                  <a:innerShdw blurRad="50900" dist="38500" dir="13500000">
+                    <a:srgbClr val="000000">
+                      <a:alpha val="60000"/>
+                    </a:srgbClr>
+                  </a:innerShdw>
+                </a:effectLst>
+                <a:latin typeface="Arial" panose="020B0604020202020204" pitchFamily="34" charset="0"/>
+                <a:cs typeface="Arial" panose="020B0604020202020204" pitchFamily="34" charset="0"/>
+                <a:sym typeface="Wingdings" panose="05000000000000000000" pitchFamily="2" charset="2"/>
+              </a:rPr>
+              <a:t>right</a:t>
             </a:r>
             <a:endParaRPr lang="en-US" sz="1200" b="1" spc="50" dirty="0" smtClean="0">
               <a:ln w="13500">
@@ -6027,7 +6057,37 @@
                 <a:cs typeface="Arial" panose="020B0604020202020204" pitchFamily="34" charset="0"/>
                 <a:sym typeface="Wingdings" panose="05000000000000000000" pitchFamily="2" charset="2"/>
               </a:rPr>
-              <a:t> the small net up</a:t>
+              <a:t> </a:t>
+            </a:r>
+            <a:r>
+              <a:rPr lang="it-IT" sz="1400" b="1" spc="50" dirty="0" smtClean="0">
+                <a:ln w="13500">
+                  <a:solidFill>
+                    <a:schemeClr val="accent1">
+                      <a:shade val="2500"/>
+                      <a:alpha val="6500"/>
+                    </a:schemeClr>
+                  </a:solidFill>
+                  <a:prstDash val="solid"/>
+                </a:ln>
+                <a:solidFill>
+                  <a:schemeClr val="accent1">
+                    <a:tint val="3000"/>
+                    <a:alpha val="95000"/>
+                  </a:schemeClr>
+                </a:solidFill>
+                <a:effectLst>
+                  <a:innerShdw blurRad="50900" dist="38500" dir="13500000">
+                    <a:srgbClr val="000000">
+                      <a:alpha val="60000"/>
+                    </a:srgbClr>
+                  </a:innerShdw>
+                </a:effectLst>
+                <a:latin typeface="Arial" panose="020B0604020202020204" pitchFamily="34" charset="0"/>
+                <a:cs typeface="Arial" panose="020B0604020202020204" pitchFamily="34" charset="0"/>
+                <a:sym typeface="Wingdings" panose="05000000000000000000" pitchFamily="2" charset="2"/>
+              </a:rPr>
+              <a:t>up</a:t>
             </a:r>
             <a:endParaRPr lang="en-US" sz="1200" b="1" spc="50" dirty="0" smtClean="0">
               <a:ln w="13500">
@@ -6148,6 +6208,36 @@
               <a:t>move</a:t>
             </a:r>
             <a:r>
+              <a:rPr lang="it-IT" sz="1400" b="1" spc="50" dirty="0">
+                <a:ln w="13500">
+                  <a:solidFill>
+                    <a:schemeClr val="accent1">
+                      <a:shade val="2500"/>
+                      <a:alpha val="6500"/>
+                    </a:schemeClr>
+                  </a:solidFill>
+                  <a:prstDash val="solid"/>
+                </a:ln>
+                <a:solidFill>
+                  <a:schemeClr val="accent1">
+                    <a:tint val="3000"/>
+                    <a:alpha val="95000"/>
+                  </a:schemeClr>
+                </a:solidFill>
+                <a:effectLst>
+                  <a:innerShdw blurRad="50900" dist="38500" dir="13500000">
+                    <a:srgbClr val="000000">
+                      <a:alpha val="60000"/>
+                    </a:srgbClr>
+                  </a:innerShdw>
+                </a:effectLst>
+                <a:latin typeface="Arial" panose="020B0604020202020204" pitchFamily="34" charset="0"/>
+                <a:cs typeface="Arial" panose="020B0604020202020204" pitchFamily="34" charset="0"/>
+                <a:sym typeface="Wingdings" panose="05000000000000000000" pitchFamily="2" charset="2"/>
+              </a:rPr>
+              <a:t> </a:t>
+            </a:r>
+            <a:r>
               <a:rPr lang="it-IT" sz="1400" b="1" spc="50" dirty="0" smtClean="0">
                 <a:ln w="13500">
                   <a:solidFill>
@@ -6175,7 +6265,7 @@
                 <a:cs typeface="Arial" panose="020B0604020202020204" pitchFamily="34" charset="0"/>
                 <a:sym typeface="Wingdings" panose="05000000000000000000" pitchFamily="2" charset="2"/>
               </a:rPr>
-              <a:t> the small net down</a:t>
+              <a:t>down</a:t>
             </a:r>
             <a:endParaRPr lang="en-US" sz="1200" b="1" spc="50" dirty="0" smtClean="0">
               <a:ln w="13500">
@@ -6274,7 +6364,7 @@
       </p:grpSpPr>
       <p:pic>
         <p:nvPicPr>
-          <p:cNvPr id="18" name="Picture 4" descr="Eating Plastic, Improving Vision, and Making Movies - JSTOR Daily"/>
+          <p:cNvPr id="6146" name="Picture 2" descr="modeling - Ocean Stretching to the Horizon? - Blender Stack Exchange"/>
           <p:cNvPicPr>
             <a:picLocks noChangeAspect="1" noChangeArrowheads="1"/>
           </p:cNvPicPr>
@@ -6288,52 +6378,13 @@
               </a:ext>
             </a:extLst>
           </a:blip>
-          <a:srcRect l="2846" r="5726" b="22857"/>
+          <a:srcRect l="26422" t="329" r="18125" b="44219"/>
           <a:stretch/>
         </p:blipFill>
         <p:spPr bwMode="auto">
           <a:xfrm>
-            <a:off x="0" y="0"/>
-            <a:ext cx="9144000" cy="5143500"/>
-          </a:xfrm>
-          <a:prstGeom prst="rect">
-            <a:avLst/>
-          </a:prstGeom>
-          <a:noFill/>
-          <a:extLst>
-            <a:ext uri="{909E8E84-426E-40DD-AFC4-6F175D3DCCD1}">
-              <a14:hiddenFill xmlns:a14="http://schemas.microsoft.com/office/drawing/2010/main">
-                <a:solidFill>
-                  <a:srgbClr val="FFFFFF"/>
-                </a:solidFill>
-              </a14:hiddenFill>
-            </a:ext>
-          </a:extLst>
-        </p:spPr>
-      </p:pic>
-      <p:pic>
-        <p:nvPicPr>
-          <p:cNvPr id="6146" name="Picture 2" descr="modeling - Ocean Stretching to the Horizon? - Blender Stack Exchange"/>
-          <p:cNvPicPr>
-            <a:picLocks noChangeAspect="1" noChangeArrowheads="1"/>
-          </p:cNvPicPr>
-          <p:nvPr/>
-        </p:nvPicPr>
-        <p:blipFill rotWithShape="1">
-          <a:blip r:embed="rId4">
-            <a:extLst>
-              <a:ext uri="{28A0092B-C50C-407E-A947-70E740481C1C}">
-                <a14:useLocalDpi xmlns:a14="http://schemas.microsoft.com/office/drawing/2010/main" val="0"/>
-              </a:ext>
-            </a:extLst>
-          </a:blip>
-          <a:srcRect l="26422" t="329" r="32528" b="44219"/>
-          <a:stretch/>
-        </p:blipFill>
-        <p:spPr bwMode="auto">
-          <a:xfrm>
-            <a:off x="-2" y="0"/>
-            <a:ext cx="6768937" cy="5143501"/>
+            <a:off x="-2" y="1"/>
+            <a:ext cx="9144002" cy="5143500"/>
           </a:xfrm>
           <a:prstGeom prst="rect">
             <a:avLst/>
@@ -6358,7 +6409,7 @@
         </p:nvSpPr>
         <p:spPr>
           <a:xfrm>
-            <a:off x="6876256" y="1416436"/>
+            <a:off x="-9230" y="763818"/>
             <a:ext cx="2160240" cy="400110"/>
           </a:xfrm>
           <a:prstGeom prst="rect">
@@ -6431,7 +6482,7 @@
         </p:nvSpPr>
         <p:spPr>
           <a:xfrm>
-            <a:off x="6876256" y="652619"/>
+            <a:off x="-9230" y="1"/>
             <a:ext cx="2160240" cy="707886"/>
           </a:xfrm>
           <a:prstGeom prst="rect">
@@ -6513,7 +6564,7 @@
           <p:nvPr/>
         </p:nvPicPr>
         <p:blipFill>
-          <a:blip r:embed="rId5" cstate="print">
+          <a:blip r:embed="rId4" cstate="print">
             <a:extLst>
               <a:ext uri="{28A0092B-C50C-407E-A947-70E740481C1C}">
                 <a14:useLocalDpi xmlns:a14="http://schemas.microsoft.com/office/drawing/2010/main" val="0"/>
@@ -6527,7 +6578,7 @@
         </p:blipFill>
         <p:spPr bwMode="auto">
           <a:xfrm>
-            <a:off x="683568" y="746036"/>
+            <a:off x="899592" y="1265538"/>
             <a:ext cx="877135" cy="877135"/>
           </a:xfrm>
           <a:prstGeom prst="rect">
@@ -6554,7 +6605,7 @@
           <p:nvPr/>
         </p:nvPicPr>
         <p:blipFill>
-          <a:blip r:embed="rId5" cstate="print">
+          <a:blip r:embed="rId4" cstate="print">
             <a:extLst>
               <a:ext uri="{28A0092B-C50C-407E-A947-70E740481C1C}">
                 <a14:useLocalDpi xmlns:a14="http://schemas.microsoft.com/office/drawing/2010/main" val="0"/>
@@ -6568,7 +6619,7 @@
         </p:blipFill>
         <p:spPr bwMode="auto">
           <a:xfrm>
-            <a:off x="1601364" y="1816546"/>
+            <a:off x="2382889" y="183420"/>
             <a:ext cx="877135" cy="877135"/>
           </a:xfrm>
           <a:prstGeom prst="rect">
@@ -6595,7 +6646,7 @@
           <p:nvPr/>
         </p:nvPicPr>
         <p:blipFill>
-          <a:blip r:embed="rId5" cstate="print">
+          <a:blip r:embed="rId4" cstate="print">
             <a:extLst>
               <a:ext uri="{28A0092B-C50C-407E-A947-70E740481C1C}">
                 <a14:useLocalDpi xmlns:a14="http://schemas.microsoft.com/office/drawing/2010/main" val="0"/>
@@ -6609,7 +6660,7 @@
         </p:blipFill>
         <p:spPr bwMode="auto">
           <a:xfrm>
-            <a:off x="2699792" y="2637238"/>
+            <a:off x="3428660" y="1870470"/>
             <a:ext cx="877135" cy="877135"/>
           </a:xfrm>
           <a:prstGeom prst="rect">
@@ -6636,7 +6687,7 @@
           <p:nvPr/>
         </p:nvPicPr>
         <p:blipFill>
-          <a:blip r:embed="rId5" cstate="print">
+          <a:blip r:embed="rId4" cstate="print">
             <a:extLst>
               <a:ext uri="{28A0092B-C50C-407E-A947-70E740481C1C}">
                 <a14:useLocalDpi xmlns:a14="http://schemas.microsoft.com/office/drawing/2010/main" val="0"/>
@@ -6650,7 +6701,7 @@
         </p:blipFill>
         <p:spPr bwMode="auto">
           <a:xfrm>
-            <a:off x="3447718" y="1923678"/>
+            <a:off x="4932040" y="2761843"/>
             <a:ext cx="877135" cy="877135"/>
           </a:xfrm>
           <a:prstGeom prst="rect">
@@ -6677,7 +6728,7 @@
           <p:nvPr/>
         </p:nvPicPr>
         <p:blipFill>
-          <a:blip r:embed="rId5" cstate="print">
+          <a:blip r:embed="rId4" cstate="print">
             <a:extLst>
               <a:ext uri="{28A0092B-C50C-407E-A947-70E740481C1C}">
                 <a14:useLocalDpi xmlns:a14="http://schemas.microsoft.com/office/drawing/2010/main" val="0"/>
@@ -6691,7 +6742,7 @@
         </p:blipFill>
         <p:spPr bwMode="auto">
           <a:xfrm>
-            <a:off x="4324853" y="1360505"/>
+            <a:off x="5809175" y="882968"/>
             <a:ext cx="877135" cy="877135"/>
           </a:xfrm>
           <a:prstGeom prst="rect">
@@ -6718,7 +6769,7 @@
           <p:nvPr/>
         </p:nvPicPr>
         <p:blipFill>
-          <a:blip r:embed="rId5" cstate="print">
+          <a:blip r:embed="rId4" cstate="print">
             <a:extLst>
               <a:ext uri="{28A0092B-C50C-407E-A947-70E740481C1C}">
                 <a14:useLocalDpi xmlns:a14="http://schemas.microsoft.com/office/drawing/2010/main" val="0"/>
@@ -6732,7 +6783,7 @@
         </p:blipFill>
         <p:spPr bwMode="auto">
           <a:xfrm>
-            <a:off x="5254402" y="652619"/>
+            <a:off x="7801108" y="2309037"/>
             <a:ext cx="877135" cy="877135"/>
           </a:xfrm>
           <a:prstGeom prst="rect">
@@ -6759,7 +6810,7 @@
           <p:nvPr/>
         </p:nvPicPr>
         <p:blipFill rotWithShape="1">
-          <a:blip r:embed="rId6" cstate="print">
+          <a:blip r:embed="rId5" cstate="print">
             <a:extLst>
               <a:ext uri="{28A0092B-C50C-407E-A947-70E740481C1C}">
                 <a14:useLocalDpi xmlns:a14="http://schemas.microsoft.com/office/drawing/2010/main" val="0"/>
@@ -6771,7 +6822,7 @@
         </p:blipFill>
         <p:spPr bwMode="auto">
           <a:xfrm>
-            <a:off x="2821457" y="4511563"/>
+            <a:off x="4244589" y="4564780"/>
             <a:ext cx="1126018" cy="506708"/>
           </a:xfrm>
           <a:prstGeom prst="rect">

</xml_diff>